<commit_message>
minor fixes template design
</commit_message>
<xml_diff>
--- a/templates/modern_dark.pptx
+++ b/templates/modern_dark.pptx
@@ -128,16 +128,6 @@
 <file path=ppt/slideLayouts/slideLayout1.xml><?xml version="1.0" encoding="utf-8"?>
 <p:sldLayout xmlns:a="http://schemas.openxmlformats.org/drawingml/2006/main" xmlns:r="http://schemas.openxmlformats.org/officeDocument/2006/relationships" xmlns:p="http://schemas.openxmlformats.org/presentationml/2006/main" showMasterSp="0" type="title" preserve="1">
   <p:cSld name="Diapositiva de título">
-    <p:bg>
-      <p:bgPr>
-        <a:solidFill>
-          <a:schemeClr val="bg2">
-            <a:lumMod val="75000"/>
-          </a:schemeClr>
-        </a:solidFill>
-        <a:effectLst/>
-      </p:bgPr>
-    </p:bg>
     <p:spTree>
       <p:nvGrpSpPr>
         <p:cNvPr id="1" name=""/>
@@ -414,7 +404,7 @@
     </p:extLst>
   </p:cSld>
   <p:clrMapOvr>
-    <a:overrideClrMapping bg1="dk1" tx1="lt1" bg2="dk2" tx2="lt2" accent1="accent1" accent2="accent2" accent3="accent3" accent4="accent4" accent5="accent5" accent6="accent6" hlink="hlink" folHlink="folHlink"/>
+    <a:masterClrMapping/>
   </p:clrMapOvr>
 </p:sldLayout>
 </file>
@@ -2797,7 +2787,7 @@
   <p:cSld>
     <p:bg>
       <p:bgRef idx="1001">
-        <a:schemeClr val="bg1"/>
+        <a:schemeClr val="bg2"/>
       </p:bgRef>
     </p:bg>
     <p:spTree>
@@ -3087,7 +3077,7 @@
       </p:ext>
     </p:extLst>
   </p:cSld>
-  <p:clrMap bg1="lt1" tx1="dk1" bg2="lt2" tx2="dk2" accent1="accent1" accent2="accent2" accent3="accent3" accent4="accent4" accent5="accent5" accent6="accent6" hlink="hlink" folHlink="folHlink"/>
+  <p:clrMap bg1="dk1" tx1="lt1" bg2="dk2" tx2="lt2" accent1="accent1" accent2="accent2" accent3="accent3" accent4="accent4" accent5="accent5" accent6="accent6" hlink="hlink" folHlink="folHlink"/>
   <p:sldLayoutIdLst>
     <p:sldLayoutId id="2147483679" r:id="rId1"/>
     <p:sldLayoutId id="2147483680" r:id="rId2"/>

</xml_diff>